<commit_message>
updates slides for Spring 20
</commit_message>
<xml_diff>
--- a/6620/slides/Introduction.pptx
+++ b/6620/slides/Introduction.pptx
@@ -276,7 +276,7 @@
           <a:p>
             <a:fld id="{7C17D75E-8F24-D747-B687-399B453A6C1A}" type="datetimeFigureOut">
               <a:rPr lang="en-US" smtClean="0"/>
-              <a:t>8/27/19</a:t>
+              <a:t>1/13/20</a:t>
             </a:fld>
             <a:endParaRPr lang="en-US"/>
           </a:p>
@@ -474,7 +474,7 @@
           <a:p>
             <a:fld id="{7C17D75E-8F24-D747-B687-399B453A6C1A}" type="datetimeFigureOut">
               <a:rPr lang="en-US" smtClean="0"/>
-              <a:t>8/27/19</a:t>
+              <a:t>1/13/20</a:t>
             </a:fld>
             <a:endParaRPr lang="en-US"/>
           </a:p>
@@ -682,7 +682,7 @@
           <a:p>
             <a:fld id="{7C17D75E-8F24-D747-B687-399B453A6C1A}" type="datetimeFigureOut">
               <a:rPr lang="en-US" smtClean="0"/>
-              <a:t>8/27/19</a:t>
+              <a:t>1/13/20</a:t>
             </a:fld>
             <a:endParaRPr lang="en-US"/>
           </a:p>
@@ -880,7 +880,7 @@
           <a:p>
             <a:fld id="{7C17D75E-8F24-D747-B687-399B453A6C1A}" type="datetimeFigureOut">
               <a:rPr lang="en-US" smtClean="0"/>
-              <a:t>8/27/19</a:t>
+              <a:t>1/13/20</a:t>
             </a:fld>
             <a:endParaRPr lang="en-US"/>
           </a:p>
@@ -1155,7 +1155,7 @@
           <a:p>
             <a:fld id="{7C17D75E-8F24-D747-B687-399B453A6C1A}" type="datetimeFigureOut">
               <a:rPr lang="en-US" smtClean="0"/>
-              <a:t>8/27/19</a:t>
+              <a:t>1/13/20</a:t>
             </a:fld>
             <a:endParaRPr lang="en-US"/>
           </a:p>
@@ -1420,7 +1420,7 @@
           <a:p>
             <a:fld id="{7C17D75E-8F24-D747-B687-399B453A6C1A}" type="datetimeFigureOut">
               <a:rPr lang="en-US" smtClean="0"/>
-              <a:t>8/27/19</a:t>
+              <a:t>1/13/20</a:t>
             </a:fld>
             <a:endParaRPr lang="en-US"/>
           </a:p>
@@ -1832,7 +1832,7 @@
           <a:p>
             <a:fld id="{7C17D75E-8F24-D747-B687-399B453A6C1A}" type="datetimeFigureOut">
               <a:rPr lang="en-US" smtClean="0"/>
-              <a:t>8/27/19</a:t>
+              <a:t>1/13/20</a:t>
             </a:fld>
             <a:endParaRPr lang="en-US"/>
           </a:p>
@@ -1973,7 +1973,7 @@
           <a:p>
             <a:fld id="{7C17D75E-8F24-D747-B687-399B453A6C1A}" type="datetimeFigureOut">
               <a:rPr lang="en-US" smtClean="0"/>
-              <a:t>8/27/19</a:t>
+              <a:t>1/13/20</a:t>
             </a:fld>
             <a:endParaRPr lang="en-US"/>
           </a:p>
@@ -2086,7 +2086,7 @@
           <a:p>
             <a:fld id="{7C17D75E-8F24-D747-B687-399B453A6C1A}" type="datetimeFigureOut">
               <a:rPr lang="en-US" smtClean="0"/>
-              <a:t>8/27/19</a:t>
+              <a:t>1/13/20</a:t>
             </a:fld>
             <a:endParaRPr lang="en-US"/>
           </a:p>
@@ -2397,7 +2397,7 @@
           <a:p>
             <a:fld id="{7C17D75E-8F24-D747-B687-399B453A6C1A}" type="datetimeFigureOut">
               <a:rPr lang="en-US" smtClean="0"/>
-              <a:t>8/27/19</a:t>
+              <a:t>1/13/20</a:t>
             </a:fld>
             <a:endParaRPr lang="en-US"/>
           </a:p>
@@ -2685,7 +2685,7 @@
           <a:p>
             <a:fld id="{7C17D75E-8F24-D747-B687-399B453A6C1A}" type="datetimeFigureOut">
               <a:rPr lang="en-US" smtClean="0"/>
-              <a:t>8/27/19</a:t>
+              <a:t>1/13/20</a:t>
             </a:fld>
             <a:endParaRPr lang="en-US"/>
           </a:p>
@@ -2926,7 +2926,7 @@
           <a:p>
             <a:fld id="{7C17D75E-8F24-D747-B687-399B453A6C1A}" type="datetimeFigureOut">
               <a:rPr lang="en-US" smtClean="0"/>
-              <a:t>8/27/19</a:t>
+              <a:t>1/13/20</a:t>
             </a:fld>
             <a:endParaRPr lang="en-US"/>
           </a:p>
@@ -3394,7 +3394,7 @@
           <a:p>
             <a:r>
               <a:rPr lang="en-US" dirty="0"/>
-              <a:t>The graduate version - Fall 2019</a:t>
+              <a:t>The graduate version - Spring 2020</a:t>
             </a:r>
           </a:p>
         </p:txBody>
@@ -9426,7 +9426,7 @@
         </p:spPr>
         <p:txBody>
           <a:bodyPr>
-            <a:normAutofit lnSpcReduction="10000"/>
+            <a:normAutofit/>
           </a:bodyPr>
           <a:lstStyle/>
           <a:p>
@@ -9461,10 +9461,10 @@
           <a:p>
             <a:pPr lvl="1"/>
             <a:r>
-              <a:rPr lang="en-US" dirty="0" err="1">
+              <a:rPr lang="en-US">
                 <a:latin typeface="Courier" pitchFamily="2" charset="0"/>
               </a:rPr>
-              <a:t>tipcc</a:t>
+              <a:t>tipc</a:t>
             </a:r>
             <a:r>
               <a:rPr lang="en-US" dirty="0">
@@ -9495,14 +9495,7 @@
           <a:p>
             <a:r>
               <a:rPr lang="en-US" dirty="0"/>
-              <a:t>Papers and prompts to drive your exploration and learning</a:t>
-            </a:r>
-          </a:p>
-          <a:p>
-            <a:pPr lvl="1"/>
-            <a:r>
-              <a:rPr lang="en-US" dirty="0"/>
-              <a:t>Research papers on optimization/testing of LLVM</a:t>
+              <a:t>Prompts to drive your exploration and learning</a:t>
             </a:r>
           </a:p>
           <a:p>
@@ -9596,7 +9589,7 @@
         </p:spPr>
         <p:txBody>
           <a:bodyPr>
-            <a:normAutofit lnSpcReduction="10000"/>
+            <a:normAutofit/>
           </a:bodyPr>
           <a:lstStyle/>
           <a:p>
@@ -9654,7 +9647,7 @@
               <a:rPr lang="en-US" dirty="0" err="1">
                 <a:latin typeface="Courier" pitchFamily="2" charset="0"/>
               </a:rPr>
-              <a:t>tipcc</a:t>
+              <a:t>tipc</a:t>
             </a:r>
             <a:r>
               <a:rPr lang="en-US" dirty="0">
@@ -9691,7 +9684,15 @@
             <a:pPr lvl="1"/>
             <a:r>
               <a:rPr lang="en-US" dirty="0"/>
-              <a:t>I can be of some help, but not enough for all of you</a:t>
+              <a:t>I can be of help for many issues (I implemented </a:t>
+            </a:r>
+            <a:r>
+              <a:rPr lang="en-US" dirty="0" err="1"/>
+              <a:t>tipc</a:t>
+            </a:r>
+            <a:r>
+              <a:rPr lang="en-US" dirty="0"/>
+              <a:t>)</a:t>
             </a:r>
           </a:p>
           <a:p>
@@ -9703,16 +9704,6 @@
             <a:endParaRPr lang="en-US" dirty="0">
               <a:sym typeface="Wingdings" pitchFamily="2" charset="2"/>
             </a:endParaRPr>
-          </a:p>
-          <a:p>
-            <a:pPr lvl="1"/>
-            <a:r>
-              <a:rPr lang="en-US" dirty="0">
-                <a:sym typeface="Wingdings" pitchFamily="2" charset="2"/>
-              </a:rPr>
-              <a:t>I can set up a forum on Collab for discussion of language and tooling issues if you would like to have a means of communicating with each other</a:t>
-            </a:r>
-            <a:endParaRPr lang="en-US" dirty="0"/>
           </a:p>
           <a:p>
             <a:pPr marL="0" indent="0">

</xml_diff>